<commit_message>
added diagram to show how webpages connect & short summary of each page
</commit_message>
<xml_diff>
--- a/Poster.pptx
+++ b/Poster.pptx
@@ -104,6 +104,11 @@
       </a:defRPr>
     </a:lvl9pPr>
   </p:defaultTextStyle>
+  <p:extLst>
+    <p:ext uri="{EFAFB233-063F-42B5-8137-9DF3F51BA10A}">
+      <p15:sldGuideLst xmlns:p15="http://schemas.microsoft.com/office/powerpoint/2012/main"/>
+    </p:ext>
+  </p:extLst>
 </p:presentation>
 </file>
 
@@ -238,7 +243,7 @@
           <a:p>
             <a:fld id="{84D78ED8-B07A-40A6-BBC8-8E7FD7DFF6E2}" type="datetimeFigureOut">
               <a:rPr lang="en-US" smtClean="0"/>
-              <a:t>5/2/2018</a:t>
+              <a:t>5/4/2018</a:t>
             </a:fld>
             <a:endParaRPr lang="en-US"/>
           </a:p>
@@ -408,7 +413,7 @@
           <a:p>
             <a:fld id="{84D78ED8-B07A-40A6-BBC8-8E7FD7DFF6E2}" type="datetimeFigureOut">
               <a:rPr lang="en-US" smtClean="0"/>
-              <a:t>5/2/2018</a:t>
+              <a:t>5/4/2018</a:t>
             </a:fld>
             <a:endParaRPr lang="en-US"/>
           </a:p>
@@ -588,7 +593,7 @@
           <a:p>
             <a:fld id="{84D78ED8-B07A-40A6-BBC8-8E7FD7DFF6E2}" type="datetimeFigureOut">
               <a:rPr lang="en-US" smtClean="0"/>
-              <a:t>5/2/2018</a:t>
+              <a:t>5/4/2018</a:t>
             </a:fld>
             <a:endParaRPr lang="en-US"/>
           </a:p>
@@ -758,7 +763,7 @@
           <a:p>
             <a:fld id="{84D78ED8-B07A-40A6-BBC8-8E7FD7DFF6E2}" type="datetimeFigureOut">
               <a:rPr lang="en-US" smtClean="0"/>
-              <a:t>5/2/2018</a:t>
+              <a:t>5/4/2018</a:t>
             </a:fld>
             <a:endParaRPr lang="en-US"/>
           </a:p>
@@ -1002,7 +1007,7 @@
           <a:p>
             <a:fld id="{84D78ED8-B07A-40A6-BBC8-8E7FD7DFF6E2}" type="datetimeFigureOut">
               <a:rPr lang="en-US" smtClean="0"/>
-              <a:t>5/2/2018</a:t>
+              <a:t>5/4/2018</a:t>
             </a:fld>
             <a:endParaRPr lang="en-US"/>
           </a:p>
@@ -1234,7 +1239,7 @@
           <a:p>
             <a:fld id="{84D78ED8-B07A-40A6-BBC8-8E7FD7DFF6E2}" type="datetimeFigureOut">
               <a:rPr lang="en-US" smtClean="0"/>
-              <a:t>5/2/2018</a:t>
+              <a:t>5/4/2018</a:t>
             </a:fld>
             <a:endParaRPr lang="en-US"/>
           </a:p>
@@ -1601,7 +1606,7 @@
           <a:p>
             <a:fld id="{84D78ED8-B07A-40A6-BBC8-8E7FD7DFF6E2}" type="datetimeFigureOut">
               <a:rPr lang="en-US" smtClean="0"/>
-              <a:t>5/2/2018</a:t>
+              <a:t>5/4/2018</a:t>
             </a:fld>
             <a:endParaRPr lang="en-US"/>
           </a:p>
@@ -1719,7 +1724,7 @@
           <a:p>
             <a:fld id="{84D78ED8-B07A-40A6-BBC8-8E7FD7DFF6E2}" type="datetimeFigureOut">
               <a:rPr lang="en-US" smtClean="0"/>
-              <a:t>5/2/2018</a:t>
+              <a:t>5/4/2018</a:t>
             </a:fld>
             <a:endParaRPr lang="en-US"/>
           </a:p>
@@ -1814,7 +1819,7 @@
           <a:p>
             <a:fld id="{84D78ED8-B07A-40A6-BBC8-8E7FD7DFF6E2}" type="datetimeFigureOut">
               <a:rPr lang="en-US" smtClean="0"/>
-              <a:t>5/2/2018</a:t>
+              <a:t>5/4/2018</a:t>
             </a:fld>
             <a:endParaRPr lang="en-US"/>
           </a:p>
@@ -2091,7 +2096,7 @@
           <a:p>
             <a:fld id="{84D78ED8-B07A-40A6-BBC8-8E7FD7DFF6E2}" type="datetimeFigureOut">
               <a:rPr lang="en-US" smtClean="0"/>
-              <a:t>5/2/2018</a:t>
+              <a:t>5/4/2018</a:t>
             </a:fld>
             <a:endParaRPr lang="en-US"/>
           </a:p>
@@ -2348,7 +2353,7 @@
           <a:p>
             <a:fld id="{84D78ED8-B07A-40A6-BBC8-8E7FD7DFF6E2}" type="datetimeFigureOut">
               <a:rPr lang="en-US" smtClean="0"/>
-              <a:t>5/2/2018</a:t>
+              <a:t>5/4/2018</a:t>
             </a:fld>
             <a:endParaRPr lang="en-US"/>
           </a:p>
@@ -2561,7 +2566,7 @@
           <a:p>
             <a:fld id="{84D78ED8-B07A-40A6-BBC8-8E7FD7DFF6E2}" type="datetimeFigureOut">
               <a:rPr lang="en-US" smtClean="0"/>
-              <a:t>5/2/2018</a:t>
+              <a:t>5/4/2018</a:t>
             </a:fld>
             <a:endParaRPr lang="en-US"/>
           </a:p>
@@ -2971,7 +2976,7 @@
           <p:cNvPr id="2" name="Title 1">
             <a:extLst>
               <a:ext uri="{FF2B5EF4-FFF2-40B4-BE49-F238E27FC236}">
-                <a16:creationId xmlns:a16="http://schemas.microsoft.com/office/drawing/2014/main" id="{FA7E9E67-2583-49F0-B518-4F485BE667DE}"/>
+                <a16:creationId xmlns="" xmlns:a16="http://schemas.microsoft.com/office/drawing/2014/main" id="{FA7E9E67-2583-49F0-B518-4F485BE667DE}"/>
               </a:ext>
             </a:extLst>
           </p:cNvPr>
@@ -3002,6 +3007,10 @@
               </a:rPr>
               <a:t>Intro</a:t>
             </a:r>
+            <a:r>
+              <a:rPr lang="en-US" sz="3600" dirty="0"/>
+              <a:t/>
+            </a:r>
             <a:br>
               <a:rPr lang="en-US" sz="3600" dirty="0"/>
             </a:br>
@@ -3021,7 +3030,7 @@
           <p:cNvPr id="3" name="Subtitle 2">
             <a:extLst>
               <a:ext uri="{FF2B5EF4-FFF2-40B4-BE49-F238E27FC236}">
-                <a16:creationId xmlns:a16="http://schemas.microsoft.com/office/drawing/2014/main" id="{3C8E17E1-4BDE-4FD7-A212-FD0AB0DA8ECE}"/>
+                <a16:creationId xmlns="" xmlns:a16="http://schemas.microsoft.com/office/drawing/2014/main" id="{3C8E17E1-4BDE-4FD7-A212-FD0AB0DA8ECE}"/>
               </a:ext>
             </a:extLst>
           </p:cNvPr>
@@ -3071,8 +3080,8 @@
               <a:t>* Three accounts associated with this </a:t>
             </a:r>
             <a:r>
-              <a:rPr lang="en-US" sz="14400" dirty="0" err="1"/>
-              <a:t>prodcut</a:t>
+              <a:rPr lang="en-US" sz="14400" dirty="0" smtClean="0"/>
+              <a:t>product</a:t>
             </a:r>
             <a:r>
               <a:rPr lang="en-US" sz="14400" dirty="0"/>
@@ -3101,7 +3110,7 @@
           <p:cNvPr id="5" name="Picture 4">
             <a:extLst>
               <a:ext uri="{FF2B5EF4-FFF2-40B4-BE49-F238E27FC236}">
-                <a16:creationId xmlns:a16="http://schemas.microsoft.com/office/drawing/2014/main" id="{532DD08B-2D79-4A06-A2FC-E4B535DABE9A}"/>
+                <a16:creationId xmlns="" xmlns:a16="http://schemas.microsoft.com/office/drawing/2014/main" id="{532DD08B-2D79-4A06-A2FC-E4B535DABE9A}"/>
               </a:ext>
             </a:extLst>
           </p:cNvPr>
@@ -3124,7 +3133,7 @@
         </p:blipFill>
         <p:spPr>
           <a:xfrm>
-            <a:off x="524135" y="595020"/>
+            <a:off x="1717343" y="1871390"/>
             <a:ext cx="11046982" cy="3482201"/>
           </a:xfrm>
           <a:prstGeom prst="rect">
@@ -3137,7 +3146,7 @@
           <p:cNvPr id="13" name="Table 12">
             <a:extLst>
               <a:ext uri="{FF2B5EF4-FFF2-40B4-BE49-F238E27FC236}">
-                <a16:creationId xmlns:a16="http://schemas.microsoft.com/office/drawing/2014/main" id="{2D9E590B-3C9D-4CD3-904F-CB1F5281CF97}"/>
+                <a16:creationId xmlns="" xmlns:a16="http://schemas.microsoft.com/office/drawing/2014/main" id="{2D9E590B-3C9D-4CD3-904F-CB1F5281CF97}"/>
               </a:ext>
             </a:extLst>
           </p:cNvPr>
@@ -3147,14 +3156,14 @@
           <p:nvPr>
             <p:extLst>
               <p:ext uri="{D42A27DB-BD31-4B8C-83A1-F6EECF244321}">
-                <p14:modId xmlns:p14="http://schemas.microsoft.com/office/powerpoint/2010/main" val="2674040176"/>
+                <p14:modId xmlns:p14="http://schemas.microsoft.com/office/powerpoint/2010/main" val="1992174508"/>
               </p:ext>
             </p:extLst>
           </p:nvPr>
         </p:nvGraphicFramePr>
         <p:xfrm>
-          <a:off x="676541" y="4695966"/>
-          <a:ext cx="12924410" cy="17312829"/>
+          <a:off x="1373881" y="14167196"/>
+          <a:ext cx="12924410" cy="17636300"/>
         </p:xfrm>
         <a:graphic>
           <a:graphicData uri="http://schemas.openxmlformats.org/drawingml/2006/table">
@@ -3166,14 +3175,14 @@
                 <a:gridCol w="1361556">
                   <a:extLst>
                     <a:ext uri="{9D8B030D-6E8A-4147-A177-3AD203B41FA5}">
-                      <a16:colId xmlns:a16="http://schemas.microsoft.com/office/drawing/2014/main" val="2401207765"/>
+                      <a16:colId xmlns="" xmlns:a16="http://schemas.microsoft.com/office/drawing/2014/main" val="2401207765"/>
                     </a:ext>
                   </a:extLst>
                 </a:gridCol>
                 <a:gridCol w="11562854">
                   <a:extLst>
                     <a:ext uri="{9D8B030D-6E8A-4147-A177-3AD203B41FA5}">
-                      <a16:colId xmlns:a16="http://schemas.microsoft.com/office/drawing/2014/main" val="3857895679"/>
+                      <a16:colId xmlns="" xmlns:a16="http://schemas.microsoft.com/office/drawing/2014/main" val="3857895679"/>
                     </a:ext>
                   </a:extLst>
                 </a:gridCol>
@@ -3196,12 +3205,12 @@
                         </a:spcAft>
                       </a:pPr>
                       <a:r>
-                        <a:rPr lang="en-US" sz="2500">
+                        <a:rPr lang="en-US" sz="2500" dirty="0">
                           <a:effectLst/>
                         </a:rPr>
                         <a:t>REQ1</a:t>
                       </a:r>
-                      <a:endParaRPr lang="en-US" sz="2500">
+                      <a:endParaRPr lang="en-US" sz="2500" dirty="0">
                         <a:effectLst/>
                         <a:latin typeface="Calibri" panose="020F0502020204030204" pitchFamily="34" charset="0"/>
                         <a:ea typeface="Yu Mincho" panose="02020400000000000000" pitchFamily="18" charset="-128"/>
@@ -3245,7 +3254,7 @@
                 </a:tc>
                 <a:extLst>
                   <a:ext uri="{0D108BD9-81ED-4DB2-BD59-A6C34878D82A}">
-                    <a16:rowId xmlns:a16="http://schemas.microsoft.com/office/drawing/2014/main" val="1591576141"/>
+                    <a16:rowId xmlns="" xmlns:a16="http://schemas.microsoft.com/office/drawing/2014/main" val="1591576141"/>
                   </a:ext>
                 </a:extLst>
               </a:tr>
@@ -3322,7 +3331,7 @@
                 </a:tc>
                 <a:extLst>
                   <a:ext uri="{0D108BD9-81ED-4DB2-BD59-A6C34878D82A}">
-                    <a16:rowId xmlns:a16="http://schemas.microsoft.com/office/drawing/2014/main" val="1227370206"/>
+                    <a16:rowId xmlns="" xmlns:a16="http://schemas.microsoft.com/office/drawing/2014/main" val="1227370206"/>
                   </a:ext>
                 </a:extLst>
               </a:tr>
@@ -3393,7 +3402,7 @@
                 </a:tc>
                 <a:extLst>
                   <a:ext uri="{0D108BD9-81ED-4DB2-BD59-A6C34878D82A}">
-                    <a16:rowId xmlns:a16="http://schemas.microsoft.com/office/drawing/2014/main" val="3853687385"/>
+                    <a16:rowId xmlns="" xmlns:a16="http://schemas.microsoft.com/office/drawing/2014/main" val="3853687385"/>
                   </a:ext>
                 </a:extLst>
               </a:tr>
@@ -3464,7 +3473,7 @@
                 </a:tc>
                 <a:extLst>
                   <a:ext uri="{0D108BD9-81ED-4DB2-BD59-A6C34878D82A}">
-                    <a16:rowId xmlns:a16="http://schemas.microsoft.com/office/drawing/2014/main" val="4136457903"/>
+                    <a16:rowId xmlns="" xmlns:a16="http://schemas.microsoft.com/office/drawing/2014/main" val="4136457903"/>
                   </a:ext>
                 </a:extLst>
               </a:tr>
@@ -3535,7 +3544,7 @@
                 </a:tc>
                 <a:extLst>
                   <a:ext uri="{0D108BD9-81ED-4DB2-BD59-A6C34878D82A}">
-                    <a16:rowId xmlns:a16="http://schemas.microsoft.com/office/drawing/2014/main" val="158184059"/>
+                    <a16:rowId xmlns="" xmlns:a16="http://schemas.microsoft.com/office/drawing/2014/main" val="158184059"/>
                   </a:ext>
                 </a:extLst>
               </a:tr>
@@ -3606,7 +3615,7 @@
                 </a:tc>
                 <a:extLst>
                   <a:ext uri="{0D108BD9-81ED-4DB2-BD59-A6C34878D82A}">
-                    <a16:rowId xmlns:a16="http://schemas.microsoft.com/office/drawing/2014/main" val="2016864343"/>
+                    <a16:rowId xmlns="" xmlns:a16="http://schemas.microsoft.com/office/drawing/2014/main" val="2016864343"/>
                   </a:ext>
                 </a:extLst>
               </a:tr>
@@ -3677,7 +3686,7 @@
                 </a:tc>
                 <a:extLst>
                   <a:ext uri="{0D108BD9-81ED-4DB2-BD59-A6C34878D82A}">
-                    <a16:rowId xmlns:a16="http://schemas.microsoft.com/office/drawing/2014/main" val="4064383691"/>
+                    <a16:rowId xmlns="" xmlns:a16="http://schemas.microsoft.com/office/drawing/2014/main" val="4064383691"/>
                   </a:ext>
                 </a:extLst>
               </a:tr>
@@ -3748,7 +3757,7 @@
                 </a:tc>
                 <a:extLst>
                   <a:ext uri="{0D108BD9-81ED-4DB2-BD59-A6C34878D82A}">
-                    <a16:rowId xmlns:a16="http://schemas.microsoft.com/office/drawing/2014/main" val="4019163768"/>
+                    <a16:rowId xmlns="" xmlns:a16="http://schemas.microsoft.com/office/drawing/2014/main" val="4019163768"/>
                   </a:ext>
                 </a:extLst>
               </a:tr>
@@ -3819,11 +3828,11 @@
                 </a:tc>
                 <a:extLst>
                   <a:ext uri="{0D108BD9-81ED-4DB2-BD59-A6C34878D82A}">
-                    <a16:rowId xmlns:a16="http://schemas.microsoft.com/office/drawing/2014/main" val="2785738743"/>
+                    <a16:rowId xmlns="" xmlns:a16="http://schemas.microsoft.com/office/drawing/2014/main" val="2785738743"/>
                   </a:ext>
                 </a:extLst>
               </a:tr>
-              <a:tr h="803988">
+              <a:tr h="955886">
                 <a:tc>
                   <a:txBody>
                     <a:bodyPr/>
@@ -3873,12 +3882,12 @@
                         </a:spcAft>
                       </a:pPr>
                       <a:r>
-                        <a:rPr lang="en-US" sz="2500">
+                        <a:rPr lang="en-US" sz="2500" dirty="0">
                           <a:effectLst/>
                         </a:rPr>
                         <a:t>Application should allow managers to assign new task or reassign task to someone else in the team</a:t>
                       </a:r>
-                      <a:endParaRPr lang="en-US" sz="2500">
+                      <a:endParaRPr lang="en-US" sz="2500" dirty="0">
                         <a:effectLst/>
                         <a:latin typeface="Calibri" panose="020F0502020204030204" pitchFamily="34" charset="0"/>
                         <a:ea typeface="Yu Mincho" panose="02020400000000000000" pitchFamily="18" charset="-128"/>
@@ -3890,7 +3899,7 @@
                 </a:tc>
                 <a:extLst>
                   <a:ext uri="{0D108BD9-81ED-4DB2-BD59-A6C34878D82A}">
-                    <a16:rowId xmlns:a16="http://schemas.microsoft.com/office/drawing/2014/main" val="1422786933"/>
+                    <a16:rowId xmlns="" xmlns:a16="http://schemas.microsoft.com/office/drawing/2014/main" val="1422786933"/>
                   </a:ext>
                 </a:extLst>
               </a:tr>
@@ -3961,7 +3970,7 @@
                 </a:tc>
                 <a:extLst>
                   <a:ext uri="{0D108BD9-81ED-4DB2-BD59-A6C34878D82A}">
-                    <a16:rowId xmlns:a16="http://schemas.microsoft.com/office/drawing/2014/main" val="3342858936"/>
+                    <a16:rowId xmlns="" xmlns:a16="http://schemas.microsoft.com/office/drawing/2014/main" val="3342858936"/>
                   </a:ext>
                 </a:extLst>
               </a:tr>
@@ -4032,7 +4041,7 @@
                 </a:tc>
                 <a:extLst>
                   <a:ext uri="{0D108BD9-81ED-4DB2-BD59-A6C34878D82A}">
-                    <a16:rowId xmlns:a16="http://schemas.microsoft.com/office/drawing/2014/main" val="2954360419"/>
+                    <a16:rowId xmlns="" xmlns:a16="http://schemas.microsoft.com/office/drawing/2014/main" val="2954360419"/>
                   </a:ext>
                 </a:extLst>
               </a:tr>
@@ -4115,7 +4124,7 @@
                 </a:tc>
                 <a:extLst>
                   <a:ext uri="{0D108BD9-81ED-4DB2-BD59-A6C34878D82A}">
-                    <a16:rowId xmlns:a16="http://schemas.microsoft.com/office/drawing/2014/main" val="3468744540"/>
+                    <a16:rowId xmlns="" xmlns:a16="http://schemas.microsoft.com/office/drawing/2014/main" val="3468744540"/>
                   </a:ext>
                 </a:extLst>
               </a:tr>
@@ -4169,12 +4178,24 @@
                         </a:spcAft>
                       </a:pPr>
                       <a:r>
-                        <a:rPr lang="en-US" sz="2500">
+                        <a:rPr lang="en-US" sz="2500" dirty="0">
                           <a:effectLst/>
                         </a:rPr>
-                        <a:t>Application should be able to generate summaries for all type of tasks,i.e., in progress tasks, completed tasks, and pending tasks.</a:t>
+                        <a:t>Application should be able to generate summaries for all type of </a:t>
                       </a:r>
-                      <a:endParaRPr lang="en-US" sz="2500">
+                      <a:r>
+                        <a:rPr lang="en-US" sz="2500" dirty="0" err="1">
+                          <a:effectLst/>
+                        </a:rPr>
+                        <a:t>tasks,i.e</a:t>
+                      </a:r>
+                      <a:r>
+                        <a:rPr lang="en-US" sz="2500" dirty="0">
+                          <a:effectLst/>
+                        </a:rPr>
+                        <a:t>., in progress tasks, completed tasks, and pending tasks.</a:t>
+                      </a:r>
+                      <a:endParaRPr lang="en-US" sz="2500" dirty="0">
                         <a:effectLst/>
                         <a:latin typeface="Calibri" panose="020F0502020204030204" pitchFamily="34" charset="0"/>
                         <a:ea typeface="Yu Mincho" panose="02020400000000000000" pitchFamily="18" charset="-128"/>
@@ -4186,7 +4207,7 @@
                 </a:tc>
                 <a:extLst>
                   <a:ext uri="{0D108BD9-81ED-4DB2-BD59-A6C34878D82A}">
-                    <a16:rowId xmlns:a16="http://schemas.microsoft.com/office/drawing/2014/main" val="429362902"/>
+                    <a16:rowId xmlns="" xmlns:a16="http://schemas.microsoft.com/office/drawing/2014/main" val="429362902"/>
                   </a:ext>
                 </a:extLst>
               </a:tr>
@@ -4257,7 +4278,7 @@
                 </a:tc>
                 <a:extLst>
                   <a:ext uri="{0D108BD9-81ED-4DB2-BD59-A6C34878D82A}">
-                    <a16:rowId xmlns:a16="http://schemas.microsoft.com/office/drawing/2014/main" val="2670606458"/>
+                    <a16:rowId xmlns="" xmlns:a16="http://schemas.microsoft.com/office/drawing/2014/main" val="2670606458"/>
                   </a:ext>
                 </a:extLst>
               </a:tr>
@@ -4328,7 +4349,7 @@
                 </a:tc>
                 <a:extLst>
                   <a:ext uri="{0D108BD9-81ED-4DB2-BD59-A6C34878D82A}">
-                    <a16:rowId xmlns:a16="http://schemas.microsoft.com/office/drawing/2014/main" val="21991332"/>
+                    <a16:rowId xmlns="" xmlns:a16="http://schemas.microsoft.com/office/drawing/2014/main" val="21991332"/>
                   </a:ext>
                 </a:extLst>
               </a:tr>
@@ -4382,12 +4403,12 @@
                         </a:spcAft>
                       </a:pPr>
                       <a:r>
-                        <a:rPr lang="en-US" sz="2500">
+                        <a:rPr lang="en-US" sz="2500" dirty="0">
                           <a:effectLst/>
                         </a:rPr>
                         <a:t>Application should display a graph for statistical data. Statistical data will be time of completion average.</a:t>
                       </a:r>
-                      <a:endParaRPr lang="en-US" sz="2500">
+                      <a:endParaRPr lang="en-US" sz="2500" dirty="0">
                         <a:effectLst/>
                         <a:latin typeface="Calibri" panose="020F0502020204030204" pitchFamily="34" charset="0"/>
                         <a:ea typeface="Yu Mincho" panose="02020400000000000000" pitchFamily="18" charset="-128"/>
@@ -4399,7 +4420,7 @@
                 </a:tc>
                 <a:extLst>
                   <a:ext uri="{0D108BD9-81ED-4DB2-BD59-A6C34878D82A}">
-                    <a16:rowId xmlns:a16="http://schemas.microsoft.com/office/drawing/2014/main" val="1039603281"/>
+                    <a16:rowId xmlns="" xmlns:a16="http://schemas.microsoft.com/office/drawing/2014/main" val="1039603281"/>
                   </a:ext>
                 </a:extLst>
               </a:tr>
@@ -4470,7 +4491,7 @@
                 </a:tc>
                 <a:extLst>
                   <a:ext uri="{0D108BD9-81ED-4DB2-BD59-A6C34878D82A}">
-                    <a16:rowId xmlns:a16="http://schemas.microsoft.com/office/drawing/2014/main" val="390061156"/>
+                    <a16:rowId xmlns="" xmlns:a16="http://schemas.microsoft.com/office/drawing/2014/main" val="390061156"/>
                   </a:ext>
                 </a:extLst>
               </a:tr>
@@ -4541,7 +4562,7 @@
                 </a:tc>
                 <a:extLst>
                   <a:ext uri="{0D108BD9-81ED-4DB2-BD59-A6C34878D82A}">
-                    <a16:rowId xmlns:a16="http://schemas.microsoft.com/office/drawing/2014/main" val="3357676708"/>
+                    <a16:rowId xmlns="" xmlns:a16="http://schemas.microsoft.com/office/drawing/2014/main" val="3357676708"/>
                   </a:ext>
                 </a:extLst>
               </a:tr>
@@ -4612,7 +4633,7 @@
                 </a:tc>
                 <a:extLst>
                   <a:ext uri="{0D108BD9-81ED-4DB2-BD59-A6C34878D82A}">
-                    <a16:rowId xmlns:a16="http://schemas.microsoft.com/office/drawing/2014/main" val="2043040716"/>
+                    <a16:rowId xmlns="" xmlns:a16="http://schemas.microsoft.com/office/drawing/2014/main" val="2043040716"/>
                   </a:ext>
                 </a:extLst>
               </a:tr>
@@ -4625,7 +4646,7 @@
           <p:cNvPr id="15" name="Picture 14">
             <a:extLst>
               <a:ext uri="{FF2B5EF4-FFF2-40B4-BE49-F238E27FC236}">
-                <a16:creationId xmlns:a16="http://schemas.microsoft.com/office/drawing/2014/main" id="{1C5D55F0-6C09-4EDF-9492-EBCEE4A94B81}"/>
+                <a16:creationId xmlns="" xmlns:a16="http://schemas.microsoft.com/office/drawing/2014/main" id="{1C5D55F0-6C09-4EDF-9492-EBCEE4A94B81}"/>
               </a:ext>
             </a:extLst>
           </p:cNvPr>
@@ -4661,7 +4682,7 @@
           <p:cNvPr id="19" name="Picture 18">
             <a:extLst>
               <a:ext uri="{FF2B5EF4-FFF2-40B4-BE49-F238E27FC236}">
-                <a16:creationId xmlns:a16="http://schemas.microsoft.com/office/drawing/2014/main" id="{4B5F93BC-B416-454A-BF73-6AFE04686563}"/>
+                <a16:creationId xmlns="" xmlns:a16="http://schemas.microsoft.com/office/drawing/2014/main" id="{4B5F93BC-B416-454A-BF73-6AFE04686563}"/>
               </a:ext>
             </a:extLst>
           </p:cNvPr>
@@ -4697,7 +4718,7 @@
           <p:cNvPr id="21" name="Picture 20">
             <a:extLst>
               <a:ext uri="{FF2B5EF4-FFF2-40B4-BE49-F238E27FC236}">
-                <a16:creationId xmlns:a16="http://schemas.microsoft.com/office/drawing/2014/main" id="{03941817-380E-4B31-95C0-683F795EE523}"/>
+                <a16:creationId xmlns="" xmlns:a16="http://schemas.microsoft.com/office/drawing/2014/main" id="{03941817-380E-4B31-95C0-683F795EE523}"/>
               </a:ext>
             </a:extLst>
           </p:cNvPr>
@@ -4707,7 +4728,7 @@
           <p:nvPr/>
         </p:nvPicPr>
         <p:blipFill>
-          <a:blip r:embed="rId5">
+          <a:blip r:embed="rId5" cstate="print">
             <a:extLst>
               <a:ext uri="{28A0092B-C50C-407E-A947-70E740481C1C}">
                 <a14:useLocalDpi xmlns:a14="http://schemas.microsoft.com/office/drawing/2010/main" val="0"/>
@@ -4733,7 +4754,7 @@
           <p:cNvPr id="23" name="Picture 22">
             <a:extLst>
               <a:ext uri="{FF2B5EF4-FFF2-40B4-BE49-F238E27FC236}">
-                <a16:creationId xmlns:a16="http://schemas.microsoft.com/office/drawing/2014/main" id="{06D54CEA-5F9E-474E-9D4C-EA456C8BA23A}"/>
+                <a16:creationId xmlns="" xmlns:a16="http://schemas.microsoft.com/office/drawing/2014/main" id="{06D54CEA-5F9E-474E-9D4C-EA456C8BA23A}"/>
               </a:ext>
             </a:extLst>
           </p:cNvPr>
@@ -4769,7 +4790,7 @@
           <p:cNvPr id="25" name="Picture 24">
             <a:extLst>
               <a:ext uri="{FF2B5EF4-FFF2-40B4-BE49-F238E27FC236}">
-                <a16:creationId xmlns:a16="http://schemas.microsoft.com/office/drawing/2014/main" id="{17AA5733-82D4-43AB-B147-9A4D79325C19}"/>
+                <a16:creationId xmlns="" xmlns:a16="http://schemas.microsoft.com/office/drawing/2014/main" id="{17AA5733-82D4-43AB-B147-9A4D79325C19}"/>
               </a:ext>
             </a:extLst>
           </p:cNvPr>
@@ -4805,7 +4826,7 @@
           <p:cNvPr id="27" name="Picture 26">
             <a:extLst>
               <a:ext uri="{FF2B5EF4-FFF2-40B4-BE49-F238E27FC236}">
-                <a16:creationId xmlns:a16="http://schemas.microsoft.com/office/drawing/2014/main" id="{2836656A-207C-4509-BE96-312DE777A7B2}"/>
+                <a16:creationId xmlns="" xmlns:a16="http://schemas.microsoft.com/office/drawing/2014/main" id="{2836656A-207C-4509-BE96-312DE777A7B2}"/>
               </a:ext>
             </a:extLst>
           </p:cNvPr>
@@ -4836,6 +4857,36 @@
           </a:prstGeom>
         </p:spPr>
       </p:pic>
+      <p:pic>
+        <p:nvPicPr>
+          <p:cNvPr id="4" name="Picture 3"/>
+          <p:cNvPicPr>
+            <a:picLocks noChangeAspect="1"/>
+          </p:cNvPicPr>
+          <p:nvPr/>
+        </p:nvPicPr>
+        <p:blipFill>
+          <a:blip r:embed="rId9">
+            <a:extLst>
+              <a:ext uri="{28A0092B-C50C-407E-A947-70E740481C1C}">
+                <a14:useLocalDpi xmlns:a14="http://schemas.microsoft.com/office/drawing/2010/main" val="0"/>
+              </a:ext>
+            </a:extLst>
+          </a:blip>
+          <a:stretch>
+            <a:fillRect/>
+          </a:stretch>
+        </p:blipFill>
+        <p:spPr>
+          <a:xfrm>
+            <a:off x="1172030" y="6333515"/>
+            <a:ext cx="12599079" cy="5884315"/>
+          </a:xfrm>
+          <a:prstGeom prst="rect">
+            <a:avLst/>
+          </a:prstGeom>
+        </p:spPr>
+      </p:pic>
     </p:spTree>
     <p:extLst>
       <p:ext uri="{BB962C8B-B14F-4D97-AF65-F5344CB8AC3E}">
@@ -4846,6 +4897,13 @@
   <p:clrMapOvr>
     <a:masterClrMapping/>
   </p:clrMapOvr>
+  <p:timing>
+    <p:tnLst>
+      <p:par>
+        <p:cTn id="1" dur="indefinite" restart="never" nodeType="tmRoot"/>
+      </p:par>
+    </p:tnLst>
+  </p:timing>
 </p:sld>
 </file>
 

</xml_diff>